<commit_message>
Modif dans le diapo
</commit_message>
<xml_diff>
--- a/Documents/Présentation.pptx
+++ b/Documents/Présentation.pptx
@@ -116,6 +116,11 @@
       </a:defRPr>
     </a:lvl9pPr>
   </p:defaultTextStyle>
+  <p:extLst>
+    <p:ext uri="{EFAFB233-063F-42B5-8137-9DF3F51BA10A}">
+      <p15:sldGuideLst xmlns:p15="http://schemas.microsoft.com/office/powerpoint/2012/main"/>
+    </p:ext>
+  </p:extLst>
 </p:presentation>
 </file>
 
@@ -7145,8 +7150,13 @@
             </a:pPr>
             <a:r>
               <a:rPr lang="fr-FR" sz="2400" dirty="0"/>
-              <a:t>HTML, PHP 7, JS, CSS, TWIG</a:t>
-            </a:r>
+              <a:t>HTML, PHP 7, JS, CSS, TWIG, </a:t>
+            </a:r>
+            <a:r>
+              <a:rPr lang="fr-FR" sz="2400"/>
+              <a:t>Materialize</a:t>
+            </a:r>
+            <a:endParaRPr lang="fr-FR" sz="2400" dirty="0"/>
           </a:p>
           <a:p>
             <a:pPr>

</xml_diff>